<commit_message>
Presentation Part1 - GraalVM
</commit_message>
<xml_diff>
--- a/GraalVM_20190815.pptx
+++ b/GraalVM_20190815.pptx
@@ -16,8 +16,8 @@
     <p:sldId id="291" r:id="rId10"/>
     <p:sldId id="276" r:id="rId11"/>
     <p:sldId id="277" r:id="rId12"/>
-    <p:sldId id="289" r:id="rId13"/>
-    <p:sldId id="284" r:id="rId14"/>
+    <p:sldId id="284" r:id="rId13"/>
+    <p:sldId id="289" r:id="rId14"/>
     <p:sldId id="280" r:id="rId15"/>
     <p:sldId id="285" r:id="rId16"/>
     <p:sldId id="287" r:id="rId17"/>
@@ -147,7 +147,7 @@
 <file path=ppt/revisionInfo.xml><?xml version="1.0" encoding="utf-8"?>
 <p1510:revInfo xmlns:a="http://schemas.openxmlformats.org/drawingml/2006/main" xmlns:r="http://schemas.openxmlformats.org/officeDocument/2006/relationships" xmlns:p1510="http://schemas.microsoft.com/office/powerpoint/2015/10/main">
   <p1510:revLst>
-    <p1510:client id="{FED3BDB6-14CB-4406-ABD0-00A2FAE5B857}" v="227" dt="2019-08-13T20:16:36.929"/>
+    <p1510:client id="{FED3BDB6-14CB-4406-ABD0-00A2FAE5B857}" v="236" dt="2019-08-14T19:18:06.033"/>
   </p1510:revLst>
 </p1510:revInfo>
 </file>
@@ -157,7 +157,7 @@
   <pc:docChgLst>
     <pc:chgData name="Rosanna Denis" userId="60867fa0-d6e9-465e-8da2-6d7253130eb1" providerId="ADAL" clId="{FED3BDB6-14CB-4406-ABD0-00A2FAE5B857}"/>
     <pc:docChg chg="undo custSel addSld delSld modSld sldOrd">
-      <pc:chgData name="Rosanna Denis" userId="60867fa0-d6e9-465e-8da2-6d7253130eb1" providerId="ADAL" clId="{FED3BDB6-14CB-4406-ABD0-00A2FAE5B857}" dt="2019-08-13T20:16:36.929" v="6465" actId="14100"/>
+      <pc:chgData name="Rosanna Denis" userId="60867fa0-d6e9-465e-8da2-6d7253130eb1" providerId="ADAL" clId="{FED3BDB6-14CB-4406-ABD0-00A2FAE5B857}" dt="2019-08-14T19:20:22.719" v="6639" actId="20577"/>
       <pc:docMkLst>
         <pc:docMk/>
       </pc:docMkLst>
@@ -288,13 +288,13 @@
         </pc:picChg>
       </pc:sldChg>
       <pc:sldChg chg="addSp delSp modSp">
-        <pc:chgData name="Rosanna Denis" userId="60867fa0-d6e9-465e-8da2-6d7253130eb1" providerId="ADAL" clId="{FED3BDB6-14CB-4406-ABD0-00A2FAE5B857}" dt="2019-08-09T12:27:20.997" v="3179" actId="20577"/>
+        <pc:chgData name="Rosanna Denis" userId="60867fa0-d6e9-465e-8da2-6d7253130eb1" providerId="ADAL" clId="{FED3BDB6-14CB-4406-ABD0-00A2FAE5B857}" dt="2019-08-14T18:39:41.865" v="6575" actId="20577"/>
         <pc:sldMkLst>
           <pc:docMk/>
           <pc:sldMk cId="2830783212" sldId="276"/>
         </pc:sldMkLst>
         <pc:spChg chg="add mod">
-          <ac:chgData name="Rosanna Denis" userId="60867fa0-d6e9-465e-8da2-6d7253130eb1" providerId="ADAL" clId="{FED3BDB6-14CB-4406-ABD0-00A2FAE5B857}" dt="2019-08-09T11:32:25.451" v="2243" actId="1035"/>
+          <ac:chgData name="Rosanna Denis" userId="60867fa0-d6e9-465e-8da2-6d7253130eb1" providerId="ADAL" clId="{FED3BDB6-14CB-4406-ABD0-00A2FAE5B857}" dt="2019-08-14T18:39:41.865" v="6575" actId="20577"/>
           <ac:spMkLst>
             <pc:docMk/>
             <pc:sldMk cId="2830783212" sldId="276"/>
@@ -438,7 +438,7 @@
         </pc:picChg>
       </pc:sldChg>
       <pc:sldChg chg="addSp delSp modSp ord setBg">
-        <pc:chgData name="Rosanna Denis" userId="60867fa0-d6e9-465e-8da2-6d7253130eb1" providerId="ADAL" clId="{FED3BDB6-14CB-4406-ABD0-00A2FAE5B857}" dt="2019-08-09T15:01:44.825" v="5442" actId="20577"/>
+        <pc:chgData name="Rosanna Denis" userId="60867fa0-d6e9-465e-8da2-6d7253130eb1" providerId="ADAL" clId="{FED3BDB6-14CB-4406-ABD0-00A2FAE5B857}" dt="2019-08-14T18:43:17.627" v="6586" actId="20577"/>
         <pc:sldMkLst>
           <pc:docMk/>
           <pc:sldMk cId="795387605" sldId="279"/>
@@ -484,7 +484,7 @@
           </ac:spMkLst>
         </pc:spChg>
         <pc:spChg chg="add mod">
-          <ac:chgData name="Rosanna Denis" userId="60867fa0-d6e9-465e-8da2-6d7253130eb1" providerId="ADAL" clId="{FED3BDB6-14CB-4406-ABD0-00A2FAE5B857}" dt="2019-08-09T15:01:44.825" v="5442" actId="20577"/>
+          <ac:chgData name="Rosanna Denis" userId="60867fa0-d6e9-465e-8da2-6d7253130eb1" providerId="ADAL" clId="{FED3BDB6-14CB-4406-ABD0-00A2FAE5B857}" dt="2019-08-14T18:43:17.627" v="6586" actId="20577"/>
           <ac:spMkLst>
             <pc:docMk/>
             <pc:sldMk cId="795387605" sldId="279"/>
@@ -619,7 +619,7 @@
         </pc:spChg>
       </pc:sldChg>
       <pc:sldChg chg="addSp delSp modSp add modNotesTx">
-        <pc:chgData name="Rosanna Denis" userId="60867fa0-d6e9-465e-8da2-6d7253130eb1" providerId="ADAL" clId="{FED3BDB6-14CB-4406-ABD0-00A2FAE5B857}" dt="2019-08-09T15:48:49.230" v="5916" actId="1076"/>
+        <pc:chgData name="Rosanna Denis" userId="60867fa0-d6e9-465e-8da2-6d7253130eb1" providerId="ADAL" clId="{FED3BDB6-14CB-4406-ABD0-00A2FAE5B857}" dt="2019-08-14T19:18:05.371" v="6638" actId="20577"/>
         <pc:sldMkLst>
           <pc:docMk/>
           <pc:sldMk cId="2476819261" sldId="282"/>
@@ -641,7 +641,7 @@
           </ac:spMkLst>
         </pc:spChg>
         <pc:spChg chg="mod">
-          <ac:chgData name="Rosanna Denis" userId="60867fa0-d6e9-465e-8da2-6d7253130eb1" providerId="ADAL" clId="{FED3BDB6-14CB-4406-ABD0-00A2FAE5B857}" dt="2019-08-09T15:08:53.651" v="5712" actId="20577"/>
+          <ac:chgData name="Rosanna Denis" userId="60867fa0-d6e9-465e-8da2-6d7253130eb1" providerId="ADAL" clId="{FED3BDB6-14CB-4406-ABD0-00A2FAE5B857}" dt="2019-08-14T19:16:28.641" v="6634" actId="20577"/>
           <ac:spMkLst>
             <pc:docMk/>
             <pc:sldMk cId="2476819261" sldId="282"/>
@@ -825,7 +825,7 @@
         </pc:picChg>
       </pc:sldChg>
       <pc:sldChg chg="addSp delSp modSp add ord">
-        <pc:chgData name="Rosanna Denis" userId="60867fa0-d6e9-465e-8da2-6d7253130eb1" providerId="ADAL" clId="{FED3BDB6-14CB-4406-ABD0-00A2FAE5B857}" dt="2019-08-09T15:54:15.903" v="5969" actId="1076"/>
+        <pc:chgData name="Rosanna Denis" userId="60867fa0-d6e9-465e-8da2-6d7253130eb1" providerId="ADAL" clId="{FED3BDB6-14CB-4406-ABD0-00A2FAE5B857}" dt="2019-08-14T18:42:55.609" v="6576"/>
         <pc:sldMkLst>
           <pc:docMk/>
           <pc:sldMk cId="3833820681" sldId="284"/>
@@ -896,7 +896,7 @@
         </pc:picChg>
       </pc:sldChg>
       <pc:sldChg chg="addSp delSp modSp add modNotesTx">
-        <pc:chgData name="Rosanna Denis" userId="60867fa0-d6e9-465e-8da2-6d7253130eb1" providerId="ADAL" clId="{FED3BDB6-14CB-4406-ABD0-00A2FAE5B857}" dt="2019-08-09T15:52:16.571" v="5960" actId="1038"/>
+        <pc:chgData name="Rosanna Denis" userId="60867fa0-d6e9-465e-8da2-6d7253130eb1" providerId="ADAL" clId="{FED3BDB6-14CB-4406-ABD0-00A2FAE5B857}" dt="2019-08-14T19:03:58.152" v="6604" actId="20577"/>
         <pc:sldMkLst>
           <pc:docMk/>
           <pc:sldMk cId="3071578888" sldId="285"/>
@@ -926,7 +926,7 @@
           </ac:spMkLst>
         </pc:spChg>
         <pc:spChg chg="add mod">
-          <ac:chgData name="Rosanna Denis" userId="60867fa0-d6e9-465e-8da2-6d7253130eb1" providerId="ADAL" clId="{FED3BDB6-14CB-4406-ABD0-00A2FAE5B857}" dt="2019-08-09T12:25:19.826" v="3077" actId="207"/>
+          <ac:chgData name="Rosanna Denis" userId="60867fa0-d6e9-465e-8da2-6d7253130eb1" providerId="ADAL" clId="{FED3BDB6-14CB-4406-ABD0-00A2FAE5B857}" dt="2019-08-14T19:03:58.152" v="6604" actId="20577"/>
           <ac:spMkLst>
             <pc:docMk/>
             <pc:sldMk cId="3071578888" sldId="285"/>
@@ -1006,7 +1006,7 @@
         </pc:spChg>
       </pc:sldChg>
       <pc:sldChg chg="addSp delSp modSp add ord modNotesTx">
-        <pc:chgData name="Rosanna Denis" userId="60867fa0-d6e9-465e-8da2-6d7253130eb1" providerId="ADAL" clId="{FED3BDB6-14CB-4406-ABD0-00A2FAE5B857}" dt="2019-08-09T15:50:14.146" v="5927" actId="1076"/>
+        <pc:chgData name="Rosanna Denis" userId="60867fa0-d6e9-465e-8da2-6d7253130eb1" providerId="ADAL" clId="{FED3BDB6-14CB-4406-ABD0-00A2FAE5B857}" dt="2019-08-14T19:05:39.350" v="6606" actId="1076"/>
         <pc:sldMkLst>
           <pc:docMk/>
           <pc:sldMk cId="589454976" sldId="288"/>
@@ -1020,7 +1020,7 @@
           </ac:spMkLst>
         </pc:spChg>
         <pc:spChg chg="mod">
-          <ac:chgData name="Rosanna Denis" userId="60867fa0-d6e9-465e-8da2-6d7253130eb1" providerId="ADAL" clId="{FED3BDB6-14CB-4406-ABD0-00A2FAE5B857}" dt="2019-08-09T12:47:28.159" v="3925" actId="20577"/>
+          <ac:chgData name="Rosanna Denis" userId="60867fa0-d6e9-465e-8da2-6d7253130eb1" providerId="ADAL" clId="{FED3BDB6-14CB-4406-ABD0-00A2FAE5B857}" dt="2019-08-14T19:05:39.350" v="6606" actId="1076"/>
           <ac:spMkLst>
             <pc:docMk/>
             <pc:sldMk cId="589454976" sldId="288"/>
@@ -1085,7 +1085,7 @@
         </pc:picChg>
       </pc:sldChg>
       <pc:sldChg chg="addSp modSp add ord modNotesTx">
-        <pc:chgData name="Rosanna Denis" userId="60867fa0-d6e9-465e-8da2-6d7253130eb1" providerId="ADAL" clId="{FED3BDB6-14CB-4406-ABD0-00A2FAE5B857}" dt="2019-08-09T14:57:58.636" v="5213" actId="20577"/>
+        <pc:chgData name="Rosanna Denis" userId="60867fa0-d6e9-465e-8da2-6d7253130eb1" providerId="ADAL" clId="{FED3BDB6-14CB-4406-ABD0-00A2FAE5B857}" dt="2019-08-14T19:00:39.056" v="6594"/>
         <pc:sldMkLst>
           <pc:docMk/>
           <pc:sldMk cId="696906928" sldId="289"/>
@@ -1099,7 +1099,7 @@
           </ac:spMkLst>
         </pc:spChg>
         <pc:spChg chg="add mod">
-          <ac:chgData name="Rosanna Denis" userId="60867fa0-d6e9-465e-8da2-6d7253130eb1" providerId="ADAL" clId="{FED3BDB6-14CB-4406-ABD0-00A2FAE5B857}" dt="2019-08-09T14:38:36.324" v="4907" actId="20577"/>
+          <ac:chgData name="Rosanna Denis" userId="60867fa0-d6e9-465e-8da2-6d7253130eb1" providerId="ADAL" clId="{FED3BDB6-14CB-4406-ABD0-00A2FAE5B857}" dt="2019-08-14T19:00:39.056" v="6594"/>
           <ac:spMkLst>
             <pc:docMk/>
             <pc:sldMk cId="696906928" sldId="289"/>
@@ -1116,13 +1116,21 @@
         </pc:picChg>
       </pc:sldChg>
       <pc:sldChg chg="modSp add">
-        <pc:chgData name="Rosanna Denis" userId="60867fa0-d6e9-465e-8da2-6d7253130eb1" providerId="ADAL" clId="{FED3BDB6-14CB-4406-ABD0-00A2FAE5B857}" dt="2019-08-09T14:51:12.414" v="5150" actId="20577"/>
+        <pc:chgData name="Rosanna Denis" userId="60867fa0-d6e9-465e-8da2-6d7253130eb1" providerId="ADAL" clId="{FED3BDB6-14CB-4406-ABD0-00A2FAE5B857}" dt="2019-08-14T17:35:51.462" v="6498" actId="1076"/>
         <pc:sldMkLst>
           <pc:docMk/>
           <pc:sldMk cId="3954514650" sldId="290"/>
         </pc:sldMkLst>
         <pc:spChg chg="mod">
-          <ac:chgData name="Rosanna Denis" userId="60867fa0-d6e9-465e-8da2-6d7253130eb1" providerId="ADAL" clId="{FED3BDB6-14CB-4406-ABD0-00A2FAE5B857}" dt="2019-08-09T14:51:12.414" v="5150" actId="20577"/>
+          <ac:chgData name="Rosanna Denis" userId="60867fa0-d6e9-465e-8da2-6d7253130eb1" providerId="ADAL" clId="{FED3BDB6-14CB-4406-ABD0-00A2FAE5B857}" dt="2019-08-14T17:35:51.462" v="6498" actId="1076"/>
+          <ac:spMkLst>
+            <pc:docMk/>
+            <pc:sldMk cId="3954514650" sldId="290"/>
+            <ac:spMk id="3" creationId="{FDFAB5C5-6731-42FB-BCB9-350B21D4E848}"/>
+          </ac:spMkLst>
+        </pc:spChg>
+        <pc:spChg chg="mod">
+          <ac:chgData name="Rosanna Denis" userId="60867fa0-d6e9-465e-8da2-6d7253130eb1" providerId="ADAL" clId="{FED3BDB6-14CB-4406-ABD0-00A2FAE5B857}" dt="2019-08-14T17:35:37.977" v="6495" actId="1076"/>
           <ac:spMkLst>
             <pc:docMk/>
             <pc:sldMk cId="3954514650" sldId="290"/>
@@ -1208,8 +1216,8 @@
           </ac:picMkLst>
         </pc:picChg>
       </pc:sldChg>
-      <pc:sldChg chg="addSp delSp modSp add">
-        <pc:chgData name="Rosanna Denis" userId="60867fa0-d6e9-465e-8da2-6d7253130eb1" providerId="ADAL" clId="{FED3BDB6-14CB-4406-ABD0-00A2FAE5B857}" dt="2019-08-13T20:16:36.929" v="6465" actId="14100"/>
+      <pc:sldChg chg="addSp delSp modSp add modNotesTx">
+        <pc:chgData name="Rosanna Denis" userId="60867fa0-d6e9-465e-8da2-6d7253130eb1" providerId="ADAL" clId="{FED3BDB6-14CB-4406-ABD0-00A2FAE5B857}" dt="2019-08-14T19:20:22.719" v="6639" actId="20577"/>
         <pc:sldMkLst>
           <pc:docMk/>
           <pc:sldMk cId="1180475438" sldId="293"/>
@@ -1374,7 +1382,7 @@
           <a:p>
             <a:fld id="{DDF2FCE7-7AFA-9242-BECB-A61CE0BE95A1}" type="datetimeFigureOut">
               <a:rPr lang="nl-NL" smtClean="0"/>
-              <a:t>13-8-2019</a:t>
+              <a:t>14-8-2019</a:t>
             </a:fld>
             <a:endParaRPr lang="nl-NL"/>
           </a:p>
@@ -1912,7 +1920,7 @@
           <a:p>
             <a:fld id="{CDFB967C-E8DF-AF4B-9B57-A68D256EEC90}" type="slidenum">
               <a:rPr lang="nl-NL" smtClean="0"/>
-              <a:t>9</a:t>
+              <a:t>10</a:t>
             </a:fld>
             <a:endParaRPr lang="nl-NL"/>
           </a:p>
@@ -2791,6 +2799,67 @@
               </a:rPr>
               <a:t>, an application developer can look up classes, methods, and fields by name and access / invoke them.</a:t>
             </a:r>
+          </a:p>
+          <a:p>
+            <a:endParaRPr lang="en-US" sz="1200" b="0" i="0" kern="1200" dirty="0">
+              <a:solidFill>
+                <a:schemeClr val="tx1"/>
+              </a:solidFill>
+              <a:effectLst/>
+              <a:latin typeface="+mn-lt"/>
+              <a:ea typeface="+mn-ea"/>
+              <a:cs typeface="+mn-cs"/>
+            </a:endParaRPr>
+          </a:p>
+          <a:p>
+            <a:r>
+              <a:rPr lang="en-US" sz="1200" b="0" i="0" kern="1200" dirty="0">
+                <a:solidFill>
+                  <a:schemeClr val="tx1"/>
+                </a:solidFill>
+                <a:effectLst/>
+                <a:latin typeface="+mn-lt"/>
+                <a:ea typeface="+mn-ea"/>
+                <a:cs typeface="+mn-cs"/>
+              </a:rPr>
+              <a:t>Java Reflection is quite powerful and can be very useful. Java Reflection makes it possible </a:t>
+            </a:r>
+            <a:r>
+              <a:rPr lang="en-US" sz="1200" b="1" i="0" kern="1200" dirty="0">
+                <a:solidFill>
+                  <a:schemeClr val="tx1"/>
+                </a:solidFill>
+                <a:effectLst/>
+                <a:latin typeface="+mn-lt"/>
+                <a:ea typeface="+mn-ea"/>
+                <a:cs typeface="+mn-cs"/>
+              </a:rPr>
+              <a:t>to inspect classes, interfaces, fields and methods at runtime,</a:t>
+            </a:r>
+            <a:r>
+              <a:rPr lang="en-US" sz="1200" b="0" i="0" kern="1200" dirty="0">
+                <a:solidFill>
+                  <a:schemeClr val="tx1"/>
+                </a:solidFill>
+                <a:effectLst/>
+                <a:latin typeface="+mn-lt"/>
+                <a:ea typeface="+mn-ea"/>
+                <a:cs typeface="+mn-cs"/>
+              </a:rPr>
+              <a:t> without knowing the names of the classes, methods etc. at compile time. It is also possible to </a:t>
+            </a:r>
+            <a:r>
+              <a:rPr lang="en-US" sz="1200" b="1" i="0" kern="1200" dirty="0">
+                <a:solidFill>
+                  <a:schemeClr val="tx1"/>
+                </a:solidFill>
+                <a:effectLst/>
+                <a:latin typeface="+mn-lt"/>
+                <a:ea typeface="+mn-ea"/>
+                <a:cs typeface="+mn-cs"/>
+              </a:rPr>
+              <a:t>instantiate new objects, invoke methods and get/set field values using reflection</a:t>
+            </a:r>
             <a:endParaRPr lang="nl-NL" dirty="0"/>
           </a:p>
         </p:txBody>
@@ -2875,58 +2944,6 @@
           <a:bodyPr/>
           <a:lstStyle/>
           <a:p>
-            <a:r>
-              <a:rPr lang="en-US" sz="1200" b="0" i="0" kern="1200" dirty="0">
-                <a:solidFill>
-                  <a:schemeClr val="tx1"/>
-                </a:solidFill>
-                <a:effectLst/>
-                <a:latin typeface="+mn-lt"/>
-                <a:ea typeface="+mn-ea"/>
-                <a:cs typeface="+mn-cs"/>
-              </a:rPr>
-              <a:t>The closed-world assumption for </a:t>
-            </a:r>
-            <a:r>
-              <a:rPr lang="en-US" sz="1200" b="0" i="0" kern="1200" dirty="0" err="1">
-                <a:solidFill>
-                  <a:schemeClr val="tx1"/>
-                </a:solidFill>
-                <a:effectLst/>
-                <a:latin typeface="+mn-lt"/>
-                <a:ea typeface="+mn-ea"/>
-                <a:cs typeface="+mn-cs"/>
-              </a:rPr>
-              <a:t>GraalVM</a:t>
-            </a:r>
-            <a:r>
-              <a:rPr lang="en-US" sz="1200" b="0" i="0" kern="1200" dirty="0">
-                <a:solidFill>
-                  <a:schemeClr val="tx1"/>
-                </a:solidFill>
-                <a:effectLst/>
-                <a:latin typeface="+mn-lt"/>
-                <a:ea typeface="+mn-ea"/>
-                <a:cs typeface="+mn-cs"/>
-              </a:rPr>
-              <a:t> native image static analyses conflicts with the open-world approach of Java reflection: Using functionality from the package </a:t>
-            </a:r>
-            <a:r>
-              <a:rPr lang="en-US" dirty="0" err="1"/>
-              <a:t>java.lang.reflect</a:t>
-            </a:r>
-            <a:r>
-              <a:rPr lang="en-US" sz="1200" b="0" i="0" kern="1200" dirty="0">
-                <a:solidFill>
-                  <a:schemeClr val="tx1"/>
-                </a:solidFill>
-                <a:effectLst/>
-                <a:latin typeface="+mn-lt"/>
-                <a:ea typeface="+mn-ea"/>
-                <a:cs typeface="+mn-cs"/>
-              </a:rPr>
-              <a:t>, an application developer can look up classes, methods, and fields by name and access / invoke them.</a:t>
-            </a:r>
             <a:endParaRPr lang="nl-NL" dirty="0"/>
           </a:p>
         </p:txBody>
@@ -3332,7 +3349,7 @@
           <a:p>
             <a:fld id="{A9710CDB-38B1-8E43-A846-6FE3B07A872E}" type="datetime1">
               <a:rPr lang="en-US" noProof="0" smtClean="0"/>
-              <a:t>8/13/2019</a:t>
+              <a:t>8/14/2019</a:t>
             </a:fld>
             <a:endParaRPr lang="nl-NL" noProof="0" dirty="0"/>
           </a:p>
@@ -3732,7 +3749,7 @@
           <a:p>
             <a:fld id="{12D8B67E-1464-254D-876A-5A059C6CA686}" type="datetime1">
               <a:rPr lang="en-US" smtClean="0"/>
-              <a:t>8/13/2019</a:t>
+              <a:t>8/14/2019</a:t>
             </a:fld>
             <a:endParaRPr lang="nl-NL"/>
           </a:p>
@@ -4150,7 +4167,7 @@
           <a:p>
             <a:fld id="{1297756A-AF1A-B249-A7CF-A1AE4E86FA38}" type="datetime1">
               <a:rPr lang="en-US" smtClean="0"/>
-              <a:t>8/13/2019</a:t>
+              <a:t>8/14/2019</a:t>
             </a:fld>
             <a:endParaRPr lang="nl-NL"/>
           </a:p>
@@ -4510,7 +4527,7 @@
           <a:p>
             <a:fld id="{37C8E900-D3BD-ED44-9070-3471A5611DC2}" type="datetime1">
               <a:rPr lang="en-US" smtClean="0"/>
-              <a:t>8/13/2019</a:t>
+              <a:t>8/14/2019</a:t>
             </a:fld>
             <a:endParaRPr lang="nl-NL"/>
           </a:p>
@@ -4687,7 +4704,7 @@
           <a:p>
             <a:fld id="{203D5A3F-EB4E-3340-8D19-07B028CB11AD}" type="datetime1">
               <a:rPr lang="en-US" smtClean="0"/>
-              <a:t>8/13/2019</a:t>
+              <a:t>8/14/2019</a:t>
             </a:fld>
             <a:endParaRPr lang="nl-NL"/>
           </a:p>
@@ -6101,7 +6118,7 @@
           <a:p>
             <a:fld id="{405216DA-0E4B-CC41-ACBF-76C3BC02E189}" type="datetime1">
               <a:rPr lang="en-US" smtClean="0"/>
-              <a:t>8/13/2019</a:t>
+              <a:t>8/14/2019</a:t>
             </a:fld>
             <a:endParaRPr lang="nl-NL"/>
           </a:p>
@@ -6348,7 +6365,7 @@
           <a:p>
             <a:fld id="{779D8D44-D820-BB49-9309-B66E37C4EE70}" type="datetime1">
               <a:rPr lang="en-US" smtClean="0"/>
-              <a:t>8/13/2019</a:t>
+              <a:t>8/14/2019</a:t>
             </a:fld>
             <a:endParaRPr lang="nl-NL"/>
           </a:p>
@@ -6522,7 +6539,7 @@
           <a:p>
             <a:fld id="{A4AB6030-B80C-7C4C-B97F-1ADFAB53E146}" type="datetime1">
               <a:rPr lang="en-US" smtClean="0"/>
-              <a:t>8/13/2019</a:t>
+              <a:t>8/14/2019</a:t>
             </a:fld>
             <a:endParaRPr lang="nl-NL"/>
           </a:p>
@@ -6740,7 +6757,7 @@
           <a:p>
             <a:fld id="{DA73B474-0AB7-8846-BA6A-67033A8CF4FA}" type="datetime1">
               <a:rPr lang="en-US" smtClean="0"/>
-              <a:t>8/13/2019</a:t>
+              <a:t>8/14/2019</a:t>
             </a:fld>
             <a:endParaRPr lang="nl-NL"/>
           </a:p>
@@ -7201,7 +7218,7 @@
           <a:p>
             <a:fld id="{56BA50C8-7311-E14C-816D-7251E320C8DC}" type="datetime1">
               <a:rPr lang="en-US" smtClean="0"/>
-              <a:t>8/13/2019</a:t>
+              <a:t>8/14/2019</a:t>
             </a:fld>
             <a:endParaRPr lang="nl-NL"/>
           </a:p>
@@ -7812,7 +7829,7 @@
           <a:p>
             <a:fld id="{A9710CDB-38B1-8E43-A846-6FE3B07A872E}" type="datetime1">
               <a:rPr lang="en-US" noProof="0" smtClean="0"/>
-              <a:t>8/13/2019</a:t>
+              <a:t>8/14/2019</a:t>
             </a:fld>
             <a:endParaRPr lang="nl-NL" noProof="0" dirty="0"/>
           </a:p>
@@ -8132,7 +8149,7 @@
           <a:p>
             <a:fld id="{E300D605-E2BB-8B4E-A2F3-5A64231C34A6}" type="datetime1">
               <a:rPr lang="en-US" smtClean="0"/>
-              <a:t>8/13/2019</a:t>
+              <a:t>8/14/2019</a:t>
             </a:fld>
             <a:endParaRPr lang="nl-NL"/>
           </a:p>
@@ -9029,7 +9046,7 @@
           <a:p>
             <a:r>
               <a:rPr lang="en-US" dirty="0"/>
-              <a:t>AOT vs JIT Compilation</a:t>
+              <a:t>Why AOT Compilation?</a:t>
             </a:r>
           </a:p>
         </p:txBody>
@@ -9127,15 +9144,15 @@
           <p:nvPr/>
         </p:nvPicPr>
         <p:blipFill>
-          <a:blip r:embed="rId2"/>
+          <a:blip r:embed="rId3"/>
           <a:stretch>
             <a:fillRect/>
           </a:stretch>
         </p:blipFill>
         <p:spPr>
           <a:xfrm>
-            <a:off x="1768839" y="1271147"/>
-            <a:ext cx="5731515" cy="3520105"/>
+            <a:off x="6236127" y="3178384"/>
+            <a:ext cx="2730718" cy="1677116"/>
           </a:xfrm>
           <a:prstGeom prst="rect">
             <a:avLst/>
@@ -9144,45 +9161,83 @@
       </p:pic>
       <p:sp>
         <p:nvSpPr>
-          <p:cNvPr id="13" name="Rectangle 12">
+          <p:cNvPr id="7" name="Content Placeholder 6">
             <a:extLst>
               <a:ext uri="{FF2B5EF4-FFF2-40B4-BE49-F238E27FC236}">
-                <a16:creationId xmlns:a16="http://schemas.microsoft.com/office/drawing/2014/main" id="{CFF65F94-92BB-49E2-B587-53C3C49E13B9}"/>
+                <a16:creationId xmlns:a16="http://schemas.microsoft.com/office/drawing/2014/main" id="{A4F3AC02-6D0C-4227-BD7A-0D4C000F9E87}"/>
               </a:ext>
             </a:extLst>
           </p:cNvPr>
-          <p:cNvSpPr/>
-          <p:nvPr/>
+          <p:cNvSpPr>
+            <a:spLocks noGrp="1"/>
+          </p:cNvSpPr>
+          <p:nvPr>
+            <p:ph idx="1"/>
+          </p:nvPr>
         </p:nvSpPr>
         <p:spPr>
           <a:xfrm>
-            <a:off x="5917721" y="4740084"/>
-            <a:ext cx="3364302" cy="230832"/>
+            <a:off x="720004" y="936000"/>
+            <a:ext cx="7262258" cy="2129489"/>
           </a:xfrm>
-          <a:prstGeom prst="rect">
-            <a:avLst/>
-          </a:prstGeom>
         </p:spPr>
         <p:txBody>
-          <a:bodyPr wrap="square">
-            <a:spAutoFit/>
-          </a:bodyPr>
+          <a:bodyPr/>
           <a:lstStyle/>
           <a:p>
             <a:r>
-              <a:rPr lang="nl-NL" sz="900" dirty="0">
-                <a:hlinkClick r:id="rId3"/>
-              </a:rPr>
-              <a:t>https://twitter.com/thomaswue/status/1145603781108928513</a:t>
-            </a:r>
-            <a:endParaRPr lang="nl-NL" sz="900" dirty="0"/>
+              <a:rPr lang="nl-NL" dirty="0"/>
+              <a:t>A new win for Java programming language and its slow (cold) start-up time</a:t>
+            </a:r>
+            <a:br>
+              <a:rPr lang="nl-NL" dirty="0"/>
+            </a:br>
+            <a:r>
+              <a:rPr lang="nl-NL" dirty="0"/>
+              <a:t>&gt; Java in the run for serverless</a:t>
+            </a:r>
+          </a:p>
+          <a:p>
+            <a:endParaRPr lang="nl-NL" dirty="0"/>
+          </a:p>
+          <a:p>
+            <a:r>
+              <a:rPr lang="nl-NL" dirty="0"/>
+              <a:t>Less use of resource will result in cutting cloud costs</a:t>
+            </a:r>
+            <a:br>
+              <a:rPr lang="nl-NL" dirty="0"/>
+            </a:br>
+            <a:r>
+              <a:rPr lang="nl-NL" dirty="0"/>
+              <a:t>&gt; Cloud equals payment for use of memory and CPU (PaaS or IaaS)</a:t>
+            </a:r>
+          </a:p>
+          <a:p>
+            <a:pPr marL="0" indent="0">
+              <a:buNone/>
+            </a:pPr>
+            <a:endParaRPr lang="nl-NL" dirty="0"/>
+          </a:p>
+          <a:p>
+            <a:r>
+              <a:rPr lang="nl-NL" dirty="0"/>
+              <a:t>Serverless cloud: Oracle’s Fn Project actually has GraalVM support inside</a:t>
+            </a:r>
+            <a:br>
+              <a:rPr lang="nl-NL" dirty="0"/>
+            </a:br>
+            <a:r>
+              <a:rPr lang="nl-NL" dirty="0"/>
+              <a:t>AWS Lambda, Google Cloud Run, Azure Functions.</a:t>
+            </a:r>
           </a:p>
         </p:txBody>
       </p:sp>
     </p:spTree>
     <p:extLst>
       <p:ext uri="{BB962C8B-B14F-4D97-AF65-F5344CB8AC3E}">
-        <p14:creationId xmlns:p14="http://schemas.microsoft.com/office/powerpoint/2010/main" val="3833820681"/>
+        <p14:creationId xmlns:p14="http://schemas.microsoft.com/office/powerpoint/2010/main" val="696906928"/>
       </p:ext>
     </p:extLst>
   </p:cSld>
@@ -9758,7 +9813,7 @@
             </a:r>
             <a:r>
               <a:rPr lang="nl-NL" sz="1300" dirty="0"/>
-              <a:t>– Open source library for creating your own languages and instrumentations for GraalVM and supports Graal variant languages such as R, Ruby, Scala, JavaScript.</a:t>
+              <a:t>– Open source library for creating your own languages and instrumentations for GraalVM and supports Graal variant languages such as R, Ruby, JavaScript, Python.</a:t>
             </a:r>
           </a:p>
           <a:p>
@@ -10154,7 +10209,12 @@
             <p:ph type="title"/>
           </p:nvPr>
         </p:nvSpPr>
-        <p:spPr/>
+        <p:spPr>
+          <a:xfrm>
+            <a:off x="719999" y="288000"/>
+            <a:ext cx="6624000" cy="504000"/>
+          </a:xfrm>
+        </p:spPr>
         <p:txBody>
           <a:bodyPr/>
           <a:lstStyle/>
@@ -11539,8 +11599,15 @@
           <a:p>
             <a:r>
               <a:rPr lang="en-US" sz="1300" dirty="0"/>
-              <a:t>JDBC programming – loading driver class </a:t>
-            </a:r>
+              <a:t>JDBC programming – loading driver class- </a:t>
+            </a:r>
+            <a:r>
+              <a:rPr lang="nl-NL" sz="1300" dirty="0"/>
+              <a:t>Class.forName() </a:t>
+            </a:r>
+            <a:br>
+              <a:rPr lang="en-US" sz="1300" dirty="0"/>
+            </a:br>
             <a:r>
               <a:rPr lang="en-US" sz="1300" dirty="0">
                 <a:sym typeface="Wingdings" panose="05000000000000000000" pitchFamily="2" charset="2"/>
@@ -12474,8 +12541,8 @@
         </p:nvSpPr>
         <p:spPr>
           <a:xfrm>
-            <a:off x="2478389" y="2352335"/>
-            <a:ext cx="2734290" cy="438830"/>
+            <a:off x="2422467" y="2205983"/>
+            <a:ext cx="2734290" cy="563393"/>
           </a:xfrm>
           <a:prstGeom prst="rect">
             <a:avLst/>
@@ -12690,8 +12757,8 @@
         </p:nvSpPr>
         <p:spPr>
           <a:xfrm>
-            <a:off x="2624896" y="2246141"/>
-            <a:ext cx="2441276" cy="307777"/>
+            <a:off x="-94225" y="2487680"/>
+            <a:ext cx="8289985" cy="2339102"/>
           </a:xfrm>
           <a:prstGeom prst="rect">
             <a:avLst/>
@@ -12714,6 +12781,73 @@
                 </a:solidFill>
               </a:rPr>
               <a:t>Hands-on</a:t>
+            </a:r>
+          </a:p>
+          <a:p>
+            <a:pPr algn="ctr"/>
+            <a:endParaRPr lang="nl-NL" sz="1600" u="sng" dirty="0">
+              <a:solidFill>
+                <a:srgbClr val="002060"/>
+              </a:solidFill>
+            </a:endParaRPr>
+          </a:p>
+          <a:p>
+            <a:pPr algn="ctr"/>
+            <a:endParaRPr lang="nl-NL" sz="1600" u="sng" dirty="0">
+              <a:solidFill>
+                <a:srgbClr val="002060"/>
+              </a:solidFill>
+            </a:endParaRPr>
+          </a:p>
+          <a:p>
+            <a:pPr algn="ctr"/>
+            <a:endParaRPr lang="nl-NL" sz="1600" u="sng" dirty="0">
+              <a:solidFill>
+                <a:srgbClr val="002060"/>
+              </a:solidFill>
+            </a:endParaRPr>
+          </a:p>
+          <a:p>
+            <a:pPr algn="ctr"/>
+            <a:endParaRPr lang="nl-NL" sz="1600" u="sng" dirty="0">
+              <a:solidFill>
+                <a:srgbClr val="002060"/>
+              </a:solidFill>
+            </a:endParaRPr>
+          </a:p>
+          <a:p>
+            <a:pPr algn="ctr"/>
+            <a:endParaRPr lang="nl-NL" sz="1600" u="sng" dirty="0">
+              <a:solidFill>
+                <a:srgbClr val="002060"/>
+              </a:solidFill>
+            </a:endParaRPr>
+          </a:p>
+          <a:p>
+            <a:pPr algn="ctr"/>
+            <a:endParaRPr lang="nl-NL" sz="1600" u="sng" dirty="0">
+              <a:solidFill>
+                <a:srgbClr val="002060"/>
+              </a:solidFill>
+            </a:endParaRPr>
+          </a:p>
+          <a:p>
+            <a:pPr algn="ctr"/>
+            <a:endParaRPr lang="nl-NL" sz="1600" u="sng" dirty="0">
+              <a:solidFill>
+                <a:srgbClr val="002060"/>
+              </a:solidFill>
+            </a:endParaRPr>
+          </a:p>
+          <a:p>
+            <a:pPr algn="ctr"/>
+            <a:r>
+              <a:rPr lang="nl-NL" sz="2000" u="sng" dirty="0">
+                <a:solidFill>
+                  <a:srgbClr val="002060"/>
+                </a:solidFill>
+              </a:rPr>
+              <a:t>https://github.com/AMIS-Services/sig-graalvm-quarkus-15082019.git</a:t>
             </a:r>
           </a:p>
         </p:txBody>
@@ -13942,12 +14076,6 @@
           <a:p>
             <a:r>
               <a:rPr lang="nl-NL" dirty="0"/>
-              <a:t>Why the need for AOT Compilation?</a:t>
-            </a:r>
-          </a:p>
-          <a:p>
-            <a:r>
-              <a:rPr lang="nl-NL" dirty="0"/>
               <a:t>AOT vs JIT compilation</a:t>
             </a:r>
           </a:p>
@@ -14522,6 +14650,12 @@
           <a:p>
             <a:r>
               <a:rPr lang="nl-NL" sz="1300" dirty="0"/>
+              <a:t>Java programs are independent of target OS</a:t>
+            </a:r>
+          </a:p>
+          <a:p>
+            <a:r>
+              <a:rPr lang="nl-NL" sz="1300" dirty="0"/>
               <a:t>Final code optimization based on workload</a:t>
             </a:r>
           </a:p>
@@ -15823,7 +15957,7 @@
           <a:p>
             <a:r>
               <a:rPr lang="en-US" dirty="0"/>
-              <a:t>Why AOT Compilation?</a:t>
+              <a:t>AOT vs JIT Compilation</a:t>
             </a:r>
           </a:p>
         </p:txBody>
@@ -15921,15 +16055,15 @@
           <p:nvPr/>
         </p:nvPicPr>
         <p:blipFill>
-          <a:blip r:embed="rId3"/>
+          <a:blip r:embed="rId2"/>
           <a:stretch>
             <a:fillRect/>
           </a:stretch>
         </p:blipFill>
         <p:spPr>
           <a:xfrm>
-            <a:off x="6236127" y="3178384"/>
-            <a:ext cx="2730718" cy="1677116"/>
+            <a:off x="1768839" y="1271147"/>
+            <a:ext cx="5731515" cy="3520105"/>
           </a:xfrm>
           <a:prstGeom prst="rect">
             <a:avLst/>
@@ -15938,83 +16072,45 @@
       </p:pic>
       <p:sp>
         <p:nvSpPr>
-          <p:cNvPr id="7" name="Content Placeholder 6">
+          <p:cNvPr id="13" name="Rectangle 12">
             <a:extLst>
               <a:ext uri="{FF2B5EF4-FFF2-40B4-BE49-F238E27FC236}">
-                <a16:creationId xmlns:a16="http://schemas.microsoft.com/office/drawing/2014/main" id="{A4F3AC02-6D0C-4227-BD7A-0D4C000F9E87}"/>
+                <a16:creationId xmlns:a16="http://schemas.microsoft.com/office/drawing/2014/main" id="{CFF65F94-92BB-49E2-B587-53C3C49E13B9}"/>
               </a:ext>
             </a:extLst>
           </p:cNvPr>
-          <p:cNvSpPr>
-            <a:spLocks noGrp="1"/>
-          </p:cNvSpPr>
-          <p:nvPr>
-            <p:ph idx="1"/>
-          </p:nvPr>
+          <p:cNvSpPr/>
+          <p:nvPr/>
         </p:nvSpPr>
         <p:spPr>
           <a:xfrm>
-            <a:off x="720004" y="936000"/>
-            <a:ext cx="7262258" cy="2129489"/>
+            <a:off x="5917721" y="4740084"/>
+            <a:ext cx="3364302" cy="230832"/>
           </a:xfrm>
+          <a:prstGeom prst="rect">
+            <a:avLst/>
+          </a:prstGeom>
         </p:spPr>
         <p:txBody>
-          <a:bodyPr/>
+          <a:bodyPr wrap="square">
+            <a:spAutoFit/>
+          </a:bodyPr>
           <a:lstStyle/>
           <a:p>
             <a:r>
-              <a:rPr lang="nl-NL" dirty="0"/>
-              <a:t>Less use of resource will result in cutting cloud costs</a:t>
-            </a:r>
-            <a:br>
-              <a:rPr lang="nl-NL" dirty="0"/>
-            </a:br>
-            <a:r>
-              <a:rPr lang="nl-NL" dirty="0"/>
-              <a:t>&gt; Cloud equals payment for use of memory and CPU (PaaS or IaaS)</a:t>
-            </a:r>
-          </a:p>
-          <a:p>
-            <a:pPr marL="0" indent="0">
-              <a:buNone/>
-            </a:pPr>
-            <a:endParaRPr lang="nl-NL" dirty="0"/>
-          </a:p>
-          <a:p>
-            <a:r>
-              <a:rPr lang="nl-NL" dirty="0"/>
-              <a:t>A new win for Java programming language and its slow (cold) start-up time</a:t>
-            </a:r>
-            <a:br>
-              <a:rPr lang="nl-NL" dirty="0"/>
-            </a:br>
-            <a:r>
-              <a:rPr lang="nl-NL" dirty="0"/>
-              <a:t>&gt; Java in the run for serverless</a:t>
-            </a:r>
-          </a:p>
-          <a:p>
-            <a:endParaRPr lang="nl-NL" dirty="0"/>
-          </a:p>
-          <a:p>
-            <a:r>
-              <a:rPr lang="nl-NL" dirty="0"/>
-              <a:t>Serverless cloud: Oracle’s Fn Project actually has GraalVM support inside</a:t>
-            </a:r>
-            <a:br>
-              <a:rPr lang="nl-NL" dirty="0"/>
-            </a:br>
-            <a:r>
-              <a:rPr lang="nl-NL" dirty="0"/>
-              <a:t>AWS Lambda, Google Cloud Functions, Azure Functions.</a:t>
-            </a:r>
+              <a:rPr lang="nl-NL" sz="900" dirty="0">
+                <a:hlinkClick r:id="rId3"/>
+              </a:rPr>
+              <a:t>https://twitter.com/thomaswue/status/1145603781108928513</a:t>
+            </a:r>
+            <a:endParaRPr lang="nl-NL" sz="900" dirty="0"/>
           </a:p>
         </p:txBody>
       </p:sp>
     </p:spTree>
     <p:extLst>
       <p:ext uri="{BB962C8B-B14F-4D97-AF65-F5344CB8AC3E}">
-        <p14:creationId xmlns:p14="http://schemas.microsoft.com/office/powerpoint/2010/main" val="696906928"/>
+        <p14:creationId xmlns:p14="http://schemas.microsoft.com/office/powerpoint/2010/main" val="3833820681"/>
       </p:ext>
     </p:extLst>
   </p:cSld>
@@ -16561,18 +16657,18 @@
 </file>
 
 <file path=customXml/item1.xml><?xml version="1.0" encoding="utf-8"?>
-<p:properties xmlns:p="http://schemas.microsoft.com/office/2006/metadata/properties" xmlns:xsi="http://www.w3.org/2001/XMLSchema-instance" xmlns:pc="http://schemas.microsoft.com/office/infopath/2007/PartnerControls">
-  <documentManagement/>
-</p:properties>
-</file>
-
-<file path=customXml/item2.xml><?xml version="1.0" encoding="utf-8"?>
 <?mso-contentType ?>
 <FormTemplates xmlns="http://schemas.microsoft.com/sharepoint/v3/contenttype/forms">
   <Display>DocumentLibraryForm</Display>
   <Edit>DocumentLibraryForm</Edit>
   <New>DocumentLibraryForm</New>
 </FormTemplates>
+</file>
+
+<file path=customXml/item2.xml><?xml version="1.0" encoding="utf-8"?>
+<p:properties xmlns:p="http://schemas.microsoft.com/office/2006/metadata/properties" xmlns:xsi="http://www.w3.org/2001/XMLSchema-instance" xmlns:pc="http://schemas.microsoft.com/office/infopath/2007/PartnerControls">
+  <documentManagement/>
+</p:properties>
 </file>
 
 <file path=customXml/item3.xml><?xml version="1.0" encoding="utf-8"?>
@@ -16690,24 +16786,24 @@
 </file>
 
 <file path=customXml/itemProps1.xml><?xml version="1.0" encoding="utf-8"?>
-<ds:datastoreItem xmlns:ds="http://schemas.openxmlformats.org/officeDocument/2006/customXml" ds:itemID="{136CD6E7-E353-4E7F-94A5-EC98CDECD98F}">
+<ds:datastoreItem xmlns:ds="http://schemas.openxmlformats.org/officeDocument/2006/customXml" ds:itemID="{2D98D3BE-EED3-483D-8008-317198627778}">
   <ds:schemaRefs>
-    <ds:schemaRef ds:uri="http://schemas.microsoft.com/office/2006/documentManagement/types"/>
-    <ds:schemaRef ds:uri="http://purl.org/dc/terms/"/>
-    <ds:schemaRef ds:uri="http://purl.org/dc/elements/1.1/"/>
-    <ds:schemaRef ds:uri="http://www.w3.org/XML/1998/namespace"/>
-    <ds:schemaRef ds:uri="http://purl.org/dc/dcmitype/"/>
-    <ds:schemaRef ds:uri="http://schemas.microsoft.com/office/infopath/2007/PartnerControls"/>
-    <ds:schemaRef ds:uri="http://schemas.openxmlformats.org/package/2006/metadata/core-properties"/>
-    <ds:schemaRef ds:uri="http://schemas.microsoft.com/office/2006/metadata/properties"/>
+    <ds:schemaRef ds:uri="http://schemas.microsoft.com/sharepoint/v3/contenttype/forms"/>
   </ds:schemaRefs>
 </ds:datastoreItem>
 </file>
 
 <file path=customXml/itemProps2.xml><?xml version="1.0" encoding="utf-8"?>
-<ds:datastoreItem xmlns:ds="http://schemas.openxmlformats.org/officeDocument/2006/customXml" ds:itemID="{2D98D3BE-EED3-483D-8008-317198627778}">
+<ds:datastoreItem xmlns:ds="http://schemas.openxmlformats.org/officeDocument/2006/customXml" ds:itemID="{136CD6E7-E353-4E7F-94A5-EC98CDECD98F}">
   <ds:schemaRefs>
-    <ds:schemaRef ds:uri="http://schemas.microsoft.com/sharepoint/v3/contenttype/forms"/>
+    <ds:schemaRef ds:uri="http://schemas.microsoft.com/office/infopath/2007/PartnerControls"/>
+    <ds:schemaRef ds:uri="http://schemas.openxmlformats.org/package/2006/metadata/core-properties"/>
+    <ds:schemaRef ds:uri="http://purl.org/dc/dcmitype/"/>
+    <ds:schemaRef ds:uri="http://schemas.microsoft.com/office/2006/documentManagement/types"/>
+    <ds:schemaRef ds:uri="http://www.w3.org/XML/1998/namespace"/>
+    <ds:schemaRef ds:uri="http://schemas.microsoft.com/office/2006/metadata/properties"/>
+    <ds:schemaRef ds:uri="http://purl.org/dc/elements/1.1/"/>
+    <ds:schemaRef ds:uri="http://purl.org/dc/terms/"/>
   </ds:schemaRefs>
 </ds:datastoreItem>
 </file>

</xml_diff>